<commit_message>
java8 Lambda Day -2 files  added
</commit_message>
<xml_diff>
--- a/PPTS and Books/Java-8 Functional Programing and Lamda's.pptx
+++ b/PPTS and Books/Java-8 Functional Programing and Lamda's.pptx
@@ -244,7 +244,7 @@
           <a:p>
             <a:fld id="{2A3E79FF-01BA-5D48-8FB4-91D723A433A5}" type="datetimeFigureOut">
               <a:rPr lang="en-US" smtClean="0"/>
-              <a:t>12/18/2017</a:t>
+              <a:t>12/19/2017</a:t>
             </a:fld>
             <a:endParaRPr lang="en-US"/>
           </a:p>
@@ -542,7 +542,7 @@
           <a:ln/>
           <a:extLst>
             <a:ext uri="{FAA26D3D-D897-4be2-8F04-BA451C77F1D7}">
-              <ma14:placeholderFlag xmlns:ma14="http://schemas.microsoft.com/office/mac/drawingml/2011/main" xmlns="" val="1"/>
+              <ma14:placeholderFlag xmlns="" xmlns:ma14="http://schemas.microsoft.com/office/mac/drawingml/2011/main" val="1"/>
             </a:ext>
           </a:extLst>
         </p:spPr>
@@ -1809,7 +1809,7 @@
           <a:p>
             <a:fld id="{81CF49A7-0D4B-FA45-882A-A0E45151897D}" type="datetimeFigureOut">
               <a:rPr lang="en-US" smtClean="0"/>
-              <a:t>12/18/2017</a:t>
+              <a:t>12/19/2017</a:t>
             </a:fld>
             <a:endParaRPr lang="en-US"/>
           </a:p>
@@ -1977,7 +1977,7 @@
           <a:p>
             <a:fld id="{81CF49A7-0D4B-FA45-882A-A0E45151897D}" type="datetimeFigureOut">
               <a:rPr lang="en-US" smtClean="0"/>
-              <a:t>12/18/2017</a:t>
+              <a:t>12/19/2017</a:t>
             </a:fld>
             <a:endParaRPr lang="en-US"/>
           </a:p>
@@ -2155,7 +2155,7 @@
           <a:p>
             <a:fld id="{81CF49A7-0D4B-FA45-882A-A0E45151897D}" type="datetimeFigureOut">
               <a:rPr lang="en-US" smtClean="0"/>
-              <a:t>12/18/2017</a:t>
+              <a:t>12/19/2017</a:t>
             </a:fld>
             <a:endParaRPr lang="en-US"/>
           </a:p>
@@ -2323,7 +2323,7 @@
           <a:p>
             <a:fld id="{81CF49A7-0D4B-FA45-882A-A0E45151897D}" type="datetimeFigureOut">
               <a:rPr lang="en-US" smtClean="0"/>
-              <a:t>12/18/2017</a:t>
+              <a:t>12/19/2017</a:t>
             </a:fld>
             <a:endParaRPr lang="en-US"/>
           </a:p>
@@ -2568,7 +2568,7 @@
           <a:p>
             <a:fld id="{81CF49A7-0D4B-FA45-882A-A0E45151897D}" type="datetimeFigureOut">
               <a:rPr lang="en-US" smtClean="0"/>
-              <a:t>12/18/2017</a:t>
+              <a:t>12/19/2017</a:t>
             </a:fld>
             <a:endParaRPr lang="en-US"/>
           </a:p>
@@ -2853,7 +2853,7 @@
           <a:p>
             <a:fld id="{81CF49A7-0D4B-FA45-882A-A0E45151897D}" type="datetimeFigureOut">
               <a:rPr lang="en-US" smtClean="0"/>
-              <a:t>12/18/2017</a:t>
+              <a:t>12/19/2017</a:t>
             </a:fld>
             <a:endParaRPr lang="en-US"/>
           </a:p>
@@ -3272,7 +3272,7 @@
           <a:p>
             <a:fld id="{81CF49A7-0D4B-FA45-882A-A0E45151897D}" type="datetimeFigureOut">
               <a:rPr lang="en-US" smtClean="0"/>
-              <a:t>12/18/2017</a:t>
+              <a:t>12/19/2017</a:t>
             </a:fld>
             <a:endParaRPr lang="en-US"/>
           </a:p>
@@ -3389,7 +3389,7 @@
           <a:p>
             <a:fld id="{81CF49A7-0D4B-FA45-882A-A0E45151897D}" type="datetimeFigureOut">
               <a:rPr lang="en-US" smtClean="0"/>
-              <a:t>12/18/2017</a:t>
+              <a:t>12/19/2017</a:t>
             </a:fld>
             <a:endParaRPr lang="en-US"/>
           </a:p>
@@ -3484,7 +3484,7 @@
           <a:p>
             <a:fld id="{81CF49A7-0D4B-FA45-882A-A0E45151897D}" type="datetimeFigureOut">
               <a:rPr lang="en-US" smtClean="0"/>
-              <a:t>12/18/2017</a:t>
+              <a:t>12/19/2017</a:t>
             </a:fld>
             <a:endParaRPr lang="en-US"/>
           </a:p>
@@ -3759,7 +3759,7 @@
           <a:p>
             <a:fld id="{81CF49A7-0D4B-FA45-882A-A0E45151897D}" type="datetimeFigureOut">
               <a:rPr lang="en-US" smtClean="0"/>
-              <a:t>12/18/2017</a:t>
+              <a:t>12/19/2017</a:t>
             </a:fld>
             <a:endParaRPr lang="en-US"/>
           </a:p>
@@ -4011,7 +4011,7 @@
           <a:p>
             <a:fld id="{81CF49A7-0D4B-FA45-882A-A0E45151897D}" type="datetimeFigureOut">
               <a:rPr lang="en-US" smtClean="0"/>
-              <a:t>12/18/2017</a:t>
+              <a:t>12/19/2017</a:t>
             </a:fld>
             <a:endParaRPr lang="en-US"/>
           </a:p>
@@ -4222,7 +4222,7 @@
           <a:p>
             <a:fld id="{81CF49A7-0D4B-FA45-882A-A0E45151897D}" type="datetimeFigureOut">
               <a:rPr lang="en-US" smtClean="0"/>
-              <a:t>12/18/2017</a:t>
+              <a:t>12/19/2017</a:t>
             </a:fld>
             <a:endParaRPr lang="en-US"/>
           </a:p>
@@ -4700,14 +4700,14 @@
           <a:effectLst/>
           <a:extLst>
             <a:ext uri="{909E8E84-426E-40dd-AFC4-6F175D3DCCD1}">
-              <a14:hiddenFill xmlns:a14="http://schemas.microsoft.com/office/drawing/2010/main" xmlns="">
+              <a14:hiddenFill xmlns="" xmlns:a14="http://schemas.microsoft.com/office/drawing/2010/main">
                 <a:solidFill>
                   <a:srgbClr val="FFFFFF"/>
                 </a:solidFill>
               </a14:hiddenFill>
             </a:ext>
             <a:ext uri="{91240B29-F687-4f45-9708-019B960494DF}">
-              <a14:hiddenLine xmlns:a14="http://schemas.microsoft.com/office/drawing/2010/main" xmlns="" w="38100">
+              <a14:hiddenLine xmlns="" xmlns:a14="http://schemas.microsoft.com/office/drawing/2010/main" w="38100">
                 <a:solidFill>
                   <a:schemeClr val="tx1"/>
                 </a:solidFill>
@@ -4717,7 +4717,7 @@
               </a14:hiddenLine>
             </a:ext>
             <a:ext uri="{AF507438-7753-43e0-B8FC-AC1667EBCBE1}">
-              <a14:hiddenEffects xmlns:a14="http://schemas.microsoft.com/office/drawing/2010/main" xmlns="">
+              <a14:hiddenEffects xmlns="" xmlns:a14="http://schemas.microsoft.com/office/drawing/2010/main">
                 <a:effectLst>
                   <a:outerShdw blurRad="63500" dist="38099" dir="2700000" algn="ctr" rotWithShape="0">
                     <a:schemeClr val="bg2">
@@ -4776,14 +4776,14 @@
           <a:effectLst/>
           <a:extLst>
             <a:ext uri="{909E8E84-426E-40dd-AFC4-6F175D3DCCD1}">
-              <a14:hiddenFill xmlns:a14="http://schemas.microsoft.com/office/drawing/2010/main" xmlns="">
+              <a14:hiddenFill xmlns="" xmlns:a14="http://schemas.microsoft.com/office/drawing/2010/main">
                 <a:solidFill>
                   <a:srgbClr val="FFFFFF"/>
                 </a:solidFill>
               </a14:hiddenFill>
             </a:ext>
             <a:ext uri="{91240B29-F687-4f45-9708-019B960494DF}">
-              <a14:hiddenLine xmlns:a14="http://schemas.microsoft.com/office/drawing/2010/main" xmlns="" w="12700">
+              <a14:hiddenLine xmlns="" xmlns:a14="http://schemas.microsoft.com/office/drawing/2010/main" w="12700">
                 <a:solidFill>
                   <a:schemeClr val="tx1"/>
                 </a:solidFill>
@@ -4793,7 +4793,7 @@
               </a14:hiddenLine>
             </a:ext>
             <a:ext uri="{AF507438-7753-43e0-B8FC-AC1667EBCBE1}">
-              <a14:hiddenEffects xmlns:a14="http://schemas.microsoft.com/office/drawing/2010/main" xmlns="">
+              <a14:hiddenEffects xmlns="" xmlns:a14="http://schemas.microsoft.com/office/drawing/2010/main">
                 <a:effectLst>
                   <a:outerShdw blurRad="63500" dist="38099" dir="2700000" algn="ctr" rotWithShape="0">
                     <a:schemeClr val="bg2">
@@ -4836,7 +4836,7 @@
           <a:graphicData uri="http://schemas.openxmlformats.org/presentationml/2006/ole">
             <mc:AlternateContent xmlns:mc="http://schemas.openxmlformats.org/markup-compatibility/2006">
               <mc:Choice xmlns:v="urn:schemas-microsoft-com:vml" Requires="v">
-                <p:oleObj spid="_x0000_s1338" name="Equation" r:id="rId4" imgW="114151" imgH="215619" progId="Equation.3">
+                <p:oleObj spid="_x0000_s1342" name="Equation" r:id="rId4" imgW="114151" imgH="215619" progId="Equation.3">
                   <p:embed/>
                 </p:oleObj>
               </mc:Choice>
@@ -4879,14 +4879,14 @@
                       <a:effectLst/>
                       <a:extLst>
                         <a:ext uri="{909E8E84-426E-40dd-AFC4-6F175D3DCCD1}">
-                          <a14:hiddenFill xmlns:a14="http://schemas.microsoft.com/office/drawing/2010/main" xmlns="">
+                          <a14:hiddenFill xmlns="" xmlns:a14="http://schemas.microsoft.com/office/drawing/2010/main">
                             <a:solidFill>
                               <a:srgbClr val="FFFFFF"/>
                             </a:solidFill>
                           </a14:hiddenFill>
                         </a:ext>
                         <a:ext uri="{91240B29-F687-4f45-9708-019B960494DF}">
-                          <a14:hiddenLine xmlns:a14="http://schemas.microsoft.com/office/drawing/2010/main" xmlns="" w="9525">
+                          <a14:hiddenLine xmlns="" xmlns:a14="http://schemas.microsoft.com/office/drawing/2010/main" w="9525">
                             <a:solidFill>
                               <a:srgbClr val="000000"/>
                             </a:solidFill>
@@ -4896,7 +4896,7 @@
                           </a14:hiddenLine>
                         </a:ext>
                         <a:ext uri="{AF507438-7753-43e0-B8FC-AC1667EBCBE1}">
-                          <a14:hiddenEffects xmlns:a14="http://schemas.microsoft.com/office/drawing/2010/main" xmlns="">
+                          <a14:hiddenEffects xmlns="" xmlns:a14="http://schemas.microsoft.com/office/drawing/2010/main">
                             <a:effectLst>
                               <a:outerShdw blurRad="63500" dist="38099" dir="2700000" algn="ctr" rotWithShape="0">
                                 <a:srgbClr val="000000">
@@ -5976,15 +5976,7 @@
           <a:p>
             <a:r>
               <a:rPr lang="en-US" sz="2800" dirty="0"/>
-              <a:t>Just as with ordinary functions, you can define local variables inside </a:t>
-            </a:r>
-            <a:r>
-              <a:rPr lang="en-US" sz="2800"/>
-              <a:t>the body of a </a:t>
-            </a:r>
-            <a:r>
-              <a:rPr lang="en-US" sz="2800" dirty="0"/>
-              <a:t>lambda expression</a:t>
+              <a:t>Just as with ordinary functions, you can define local variables inside the body of a lambda expression</a:t>
             </a:r>
           </a:p>
           <a:p>
@@ -6200,7 +6192,7 @@
                 <a:latin typeface="Lucida Console"/>
                 <a:cs typeface="Lucida Console"/>
               </a:rPr>
-              <a:t>((Integer x -&gt; {</a:t>
+              <a:t>((Integer x) -&gt; {</a:t>
             </a:r>
           </a:p>
           <a:p>
@@ -7010,7 +7002,7 @@
                 <a:latin typeface="Lucida Console"/>
                 <a:cs typeface="Lucida Console"/>
               </a:rPr>
-              <a:t>Arrrays.asList</a:t>
+              <a:t>Arrays.asList</a:t>
             </a:r>
             <a:r>
               <a:rPr lang="en-US" sz="2000" dirty="0">

</xml_diff>